<commit_message>
Now includes link to itself
How meta.
</commit_message>
<xml_diff>
--- a/Planets on the Edge 2025/Signs of Migrating Icy Worlds in the Radius Valley.pptx
+++ b/Planets on the Edge 2025/Signs of Migrating Icy Worlds in the Radius Valley.pptx
@@ -5759,7 +5759,7 @@
                 <a:ea typeface="Roboto" panose="02000000000000000000" pitchFamily="2" charset="0"/>
                 <a:cs typeface="Roboto" panose="02000000000000000000" pitchFamily="2" charset="0"/>
               </a:rPr>
-              <a:t>Statistically quantify synthetic-observed discrepancy</a:t>
+              <a:t>Statistically quantify synthetic-observational discrepancy</a:t>
             </a:r>
           </a:p>
           <a:p>
@@ -8898,13 +8898,15 @@
               </a:ext>
             </a:extLst>
           </p:cNvPr>
-          <p:cNvCxnSpPr/>
+          <p:cNvCxnSpPr>
+            <a:cxnSpLocks/>
+          </p:cNvCxnSpPr>
           <p:nvPr/>
         </p:nvCxnSpPr>
         <p:spPr>
           <a:xfrm>
             <a:off x="21778406" y="30830350"/>
-            <a:ext cx="2668471" cy="0"/>
+            <a:ext cx="2464917" cy="0"/>
           </a:xfrm>
           <a:prstGeom prst="line">
             <a:avLst/>
@@ -8942,8 +8944,8 @@
         </p:nvCxnSpPr>
         <p:spPr>
           <a:xfrm flipH="1">
-            <a:off x="23093621" y="26477764"/>
-            <a:ext cx="3080479" cy="4300051"/>
+            <a:off x="23010864" y="26477764"/>
+            <a:ext cx="3163236" cy="4334043"/>
           </a:xfrm>
           <a:prstGeom prst="line">
             <a:avLst/>
@@ -9216,6 +9218,81 @@
               <a:ea typeface="Roboto" panose="02000000000000000000" pitchFamily="2" charset="0"/>
               <a:cs typeface="Roboto" panose="02000000000000000000" pitchFamily="2" charset="0"/>
             </a:endParaRPr>
+          </a:p>
+        </p:txBody>
+      </p:sp>
+      <p:pic>
+        <p:nvPicPr>
+          <p:cNvPr id="22" name="Picture 21" descr="A qr code on a white background&#10;&#10;AI-generated content may be incorrect.">
+            <a:extLst>
+              <a:ext uri="{FF2B5EF4-FFF2-40B4-BE49-F238E27FC236}">
+                <a16:creationId xmlns:a16="http://schemas.microsoft.com/office/drawing/2014/main" id="{3EED838C-7C71-FFA1-F40B-083F94BCC249}"/>
+              </a:ext>
+            </a:extLst>
+          </p:cNvPr>
+          <p:cNvPicPr>
+            <a:picLocks noChangeAspect="1"/>
+          </p:cNvPicPr>
+          <p:nvPr/>
+        </p:nvPicPr>
+        <p:blipFill>
+          <a:blip r:embed="rId10" cstate="print">
+            <a:extLst>
+              <a:ext uri="{28A0092B-C50C-407E-A947-70E740481C1C}">
+                <a14:useLocalDpi xmlns:a14="http://schemas.microsoft.com/office/drawing/2010/main" val="0"/>
+              </a:ext>
+            </a:extLst>
+          </a:blip>
+          <a:stretch>
+            <a:fillRect/>
+          </a:stretch>
+        </p:blipFill>
+        <p:spPr>
+          <a:xfrm>
+            <a:off x="822960" y="2321998"/>
+            <a:ext cx="2011680" cy="2011680"/>
+          </a:xfrm>
+          <a:prstGeom prst="rect">
+            <a:avLst/>
+          </a:prstGeom>
+        </p:spPr>
+      </p:pic>
+      <p:sp>
+        <p:nvSpPr>
+          <p:cNvPr id="36" name="TextBox 35">
+            <a:extLst>
+              <a:ext uri="{FF2B5EF4-FFF2-40B4-BE49-F238E27FC236}">
+                <a16:creationId xmlns:a16="http://schemas.microsoft.com/office/drawing/2014/main" id="{C81240CC-EE4C-7958-5631-64646048ADC6}"/>
+              </a:ext>
+            </a:extLst>
+          </p:cNvPr>
+          <p:cNvSpPr txBox="1"/>
+          <p:nvPr/>
+        </p:nvSpPr>
+        <p:spPr>
+          <a:xfrm>
+            <a:off x="2804395" y="3004672"/>
+            <a:ext cx="3019679" cy="646331"/>
+          </a:xfrm>
+          <a:prstGeom prst="rect">
+            <a:avLst/>
+          </a:prstGeom>
+          <a:noFill/>
+        </p:spPr>
+        <p:txBody>
+          <a:bodyPr wrap="square" rtlCol="0">
+            <a:spAutoFit/>
+          </a:bodyPr>
+          <a:lstStyle/>
+          <a:p>
+            <a:r>
+              <a:rPr lang="en-US" dirty="0">
+                <a:latin typeface="Roboto" panose="02000000000000000000" pitchFamily="2" charset="0"/>
+                <a:ea typeface="Roboto" panose="02000000000000000000" pitchFamily="2" charset="0"/>
+                <a:cs typeface="Roboto" panose="02000000000000000000" pitchFamily="2" charset="0"/>
+              </a:rPr>
+              <a:t>https://tinyurl.com/Bennett-Skinner-PLANETSEDGE25</a:t>
+            </a:r>
           </a:p>
         </p:txBody>
       </p:sp>

</xml_diff>